<commit_message>
COLOURS GAME AND MECHANICS:
Implemented basics of games, basic levels and mechanics for games
running. Basic ui features to show game progress and select game and
level.
</commit_message>
<xml_diff>
--- a/gnocchi/src/uk/dangrew/gnocchi/ui/resources/grid-icons.pptx
+++ b/gnocchi/src/uk/dangrew/gnocchi/ui/resources/grid-icons.pptx
@@ -9,6 +9,7 @@
     <p:sldId id="256" r:id="rId3"/>
     <p:sldId id="258" r:id="rId4"/>
     <p:sldId id="259" r:id="rId5"/>
+    <p:sldId id="260" r:id="rId6"/>
   </p:sldIdLst>
   <p:sldSz cx="12192000" cy="6858000"/>
   <p:notesSz cx="6858000" cy="9144000"/>
@@ -144,7 +145,7 @@
         </p:nvSpPr>
         <p:spPr>
           <a:xfrm>
-            <a:off x="1524000" y="1122363"/>
+            <a:off x="1524001" y="1122365"/>
             <a:ext cx="9144001" cy="2387601"/>
           </a:xfrm>
         </p:spPr>
@@ -152,7 +153,7 @@
           <a:bodyPr anchor="b"/>
           <a:lstStyle>
             <a:lvl1pPr algn="ctr">
-              <a:defRPr sz="6002"/>
+              <a:defRPr sz="6003"/>
             </a:lvl1pPr>
           </a:lstStyle>
           <a:p>
@@ -176,7 +177,7 @@
         </p:nvSpPr>
         <p:spPr>
           <a:xfrm>
-            <a:off x="1524000" y="3602039"/>
+            <a:off x="1524001" y="3602039"/>
             <a:ext cx="9144001" cy="1655762"/>
           </a:xfrm>
         </p:spPr>
@@ -187,35 +188,35 @@
               <a:buNone/>
               <a:defRPr sz="2401"/>
             </a:lvl1pPr>
-            <a:lvl2pPr marL="457240" indent="0" algn="ctr">
+            <a:lvl2pPr marL="457229" indent="0" algn="ctr">
               <a:buNone/>
               <a:defRPr sz="2000"/>
             </a:lvl2pPr>
-            <a:lvl3pPr marL="914480" indent="0" algn="ctr">
+            <a:lvl3pPr marL="914457" indent="0" algn="ctr">
               <a:buNone/>
               <a:defRPr sz="1799"/>
             </a:lvl3pPr>
-            <a:lvl4pPr marL="1371720" indent="0" algn="ctr">
+            <a:lvl4pPr marL="1371686" indent="0" algn="ctr">
               <a:buNone/>
               <a:defRPr sz="1601"/>
             </a:lvl4pPr>
-            <a:lvl5pPr marL="1828961" indent="0" algn="ctr">
+            <a:lvl5pPr marL="1828916" indent="0" algn="ctr">
               <a:buNone/>
               <a:defRPr sz="1601"/>
             </a:lvl5pPr>
-            <a:lvl6pPr marL="2286201" indent="0" algn="ctr">
+            <a:lvl6pPr marL="2286144" indent="0" algn="ctr">
               <a:buNone/>
               <a:defRPr sz="1601"/>
             </a:lvl6pPr>
-            <a:lvl7pPr marL="2743441" indent="0" algn="ctr">
+            <a:lvl7pPr marL="2743373" indent="0" algn="ctr">
               <a:buNone/>
               <a:defRPr sz="1601"/>
             </a:lvl7pPr>
-            <a:lvl8pPr marL="3200679" indent="0" algn="ctr">
+            <a:lvl8pPr marL="3200599" indent="0" algn="ctr">
               <a:buNone/>
               <a:defRPr sz="1601"/>
             </a:lvl8pPr>
-            <a:lvl9pPr marL="3657919" indent="0" algn="ctr">
+            <a:lvl9pPr marL="3657827" indent="0" algn="ctr">
               <a:buNone/>
               <a:defRPr sz="1601"/>
             </a:lvl9pPr>
@@ -246,7 +247,7 @@
           <a:p>
             <a:fld id="{6A59AB8E-9AF4-1E40-AC94-F82003CC56E0}" type="datetimeFigureOut">
               <a:rPr lang="en-US" smtClean="0"/>
-              <a:t>9/19/17</a:t>
+              <a:t>9/23/17</a:t>
             </a:fld>
             <a:endParaRPr lang="en-US"/>
           </a:p>
@@ -416,7 +417,7 @@
           <a:p>
             <a:fld id="{6A59AB8E-9AF4-1E40-AC94-F82003CC56E0}" type="datetimeFigureOut">
               <a:rPr lang="en-US" smtClean="0"/>
-              <a:t>9/19/17</a:t>
+              <a:t>9/23/17</a:t>
             </a:fld>
             <a:endParaRPr lang="en-US"/>
           </a:p>
@@ -506,7 +507,7 @@
         </p:nvSpPr>
         <p:spPr>
           <a:xfrm>
-            <a:off x="8724902" y="365125"/>
+            <a:off x="8724903" y="365125"/>
             <a:ext cx="2628901" cy="5811838"/>
           </a:xfrm>
         </p:spPr>
@@ -596,7 +597,7 @@
           <a:p>
             <a:fld id="{6A59AB8E-9AF4-1E40-AC94-F82003CC56E0}" type="datetimeFigureOut">
               <a:rPr lang="en-US" smtClean="0"/>
-              <a:t>9/19/17</a:t>
+              <a:t>9/23/17</a:t>
             </a:fld>
             <a:endParaRPr lang="en-US"/>
           </a:p>
@@ -766,7 +767,7 @@
           <a:p>
             <a:fld id="{6A59AB8E-9AF4-1E40-AC94-F82003CC56E0}" type="datetimeFigureOut">
               <a:rPr lang="en-US" smtClean="0"/>
-              <a:t>9/19/17</a:t>
+              <a:t>9/23/17</a:t>
             </a:fld>
             <a:endParaRPr lang="en-US"/>
           </a:p>
@@ -856,7 +857,7 @@
         </p:nvSpPr>
         <p:spPr>
           <a:xfrm>
-            <a:off x="831852" y="1709739"/>
+            <a:off x="831852" y="1709741"/>
             <a:ext cx="10515600" cy="2852737"/>
           </a:xfrm>
         </p:spPr>
@@ -864,7 +865,7 @@
           <a:bodyPr anchor="b"/>
           <a:lstStyle>
             <a:lvl1pPr>
-              <a:defRPr sz="6002"/>
+              <a:defRPr sz="6003"/>
             </a:lvl1pPr>
           </a:lstStyle>
           <a:p>
@@ -888,7 +889,7 @@
         </p:nvSpPr>
         <p:spPr>
           <a:xfrm>
-            <a:off x="831852" y="4589464"/>
+            <a:off x="831852" y="4589466"/>
             <a:ext cx="10515600" cy="1500187"/>
           </a:xfrm>
         </p:spPr>
@@ -905,7 +906,7 @@
                 </a:solidFill>
               </a:defRPr>
             </a:lvl1pPr>
-            <a:lvl2pPr marL="457240" indent="0">
+            <a:lvl2pPr marL="457229" indent="0">
               <a:buNone/>
               <a:defRPr sz="2000">
                 <a:solidFill>
@@ -915,7 +916,7 @@
                 </a:solidFill>
               </a:defRPr>
             </a:lvl2pPr>
-            <a:lvl3pPr marL="914480" indent="0">
+            <a:lvl3pPr marL="914457" indent="0">
               <a:buNone/>
               <a:defRPr sz="1799">
                 <a:solidFill>
@@ -925,7 +926,7 @@
                 </a:solidFill>
               </a:defRPr>
             </a:lvl3pPr>
-            <a:lvl4pPr marL="1371720" indent="0">
+            <a:lvl4pPr marL="1371686" indent="0">
               <a:buNone/>
               <a:defRPr sz="1601">
                 <a:solidFill>
@@ -935,7 +936,7 @@
                 </a:solidFill>
               </a:defRPr>
             </a:lvl4pPr>
-            <a:lvl5pPr marL="1828961" indent="0">
+            <a:lvl5pPr marL="1828916" indent="0">
               <a:buNone/>
               <a:defRPr sz="1601">
                 <a:solidFill>
@@ -945,7 +946,7 @@
                 </a:solidFill>
               </a:defRPr>
             </a:lvl5pPr>
-            <a:lvl6pPr marL="2286201" indent="0">
+            <a:lvl6pPr marL="2286144" indent="0">
               <a:buNone/>
               <a:defRPr sz="1601">
                 <a:solidFill>
@@ -955,7 +956,7 @@
                 </a:solidFill>
               </a:defRPr>
             </a:lvl6pPr>
-            <a:lvl7pPr marL="2743441" indent="0">
+            <a:lvl7pPr marL="2743373" indent="0">
               <a:buNone/>
               <a:defRPr sz="1601">
                 <a:solidFill>
@@ -965,7 +966,7 @@
                 </a:solidFill>
               </a:defRPr>
             </a:lvl7pPr>
-            <a:lvl8pPr marL="3200679" indent="0">
+            <a:lvl8pPr marL="3200599" indent="0">
               <a:buNone/>
               <a:defRPr sz="1601">
                 <a:solidFill>
@@ -975,7 +976,7 @@
                 </a:solidFill>
               </a:defRPr>
             </a:lvl8pPr>
-            <a:lvl9pPr marL="3657919" indent="0">
+            <a:lvl9pPr marL="3657827" indent="0">
               <a:buNone/>
               <a:defRPr sz="1601">
                 <a:solidFill>
@@ -1012,7 +1013,7 @@
           <a:p>
             <a:fld id="{6A59AB8E-9AF4-1E40-AC94-F82003CC56E0}" type="datetimeFigureOut">
               <a:rPr lang="en-US" smtClean="0"/>
-              <a:t>9/19/17</a:t>
+              <a:t>9/23/17</a:t>
             </a:fld>
             <a:endParaRPr lang="en-US"/>
           </a:p>
@@ -1125,7 +1126,7 @@
         </p:nvSpPr>
         <p:spPr>
           <a:xfrm>
-            <a:off x="838200" y="1825626"/>
+            <a:off x="838201" y="1825626"/>
             <a:ext cx="5181601" cy="4351338"/>
           </a:xfrm>
         </p:spPr>
@@ -1182,7 +1183,7 @@
         </p:nvSpPr>
         <p:spPr>
           <a:xfrm>
-            <a:off x="6172202" y="1825626"/>
+            <a:off x="6172204" y="1825626"/>
             <a:ext cx="5181601" cy="4351338"/>
           </a:xfrm>
         </p:spPr>
@@ -1244,7 +1245,7 @@
           <a:p>
             <a:fld id="{6A59AB8E-9AF4-1E40-AC94-F82003CC56E0}" type="datetimeFigureOut">
               <a:rPr lang="en-US" smtClean="0"/>
-              <a:t>9/19/17</a:t>
+              <a:t>9/23/17</a:t>
             </a:fld>
             <a:endParaRPr lang="en-US"/>
           </a:p>
@@ -1373,35 +1374,35 @@
               <a:buNone/>
               <a:defRPr sz="2401" b="1"/>
             </a:lvl1pPr>
-            <a:lvl2pPr marL="457240" indent="0">
+            <a:lvl2pPr marL="457229" indent="0">
               <a:buNone/>
               <a:defRPr sz="2000" b="1"/>
             </a:lvl2pPr>
-            <a:lvl3pPr marL="914480" indent="0">
+            <a:lvl3pPr marL="914457" indent="0">
               <a:buNone/>
               <a:defRPr sz="1799" b="1"/>
             </a:lvl3pPr>
-            <a:lvl4pPr marL="1371720" indent="0">
+            <a:lvl4pPr marL="1371686" indent="0">
               <a:buNone/>
               <a:defRPr sz="1601" b="1"/>
             </a:lvl4pPr>
-            <a:lvl5pPr marL="1828961" indent="0">
+            <a:lvl5pPr marL="1828916" indent="0">
               <a:buNone/>
               <a:defRPr sz="1601" b="1"/>
             </a:lvl5pPr>
-            <a:lvl6pPr marL="2286201" indent="0">
+            <a:lvl6pPr marL="2286144" indent="0">
               <a:buNone/>
               <a:defRPr sz="1601" b="1"/>
             </a:lvl6pPr>
-            <a:lvl7pPr marL="2743441" indent="0">
+            <a:lvl7pPr marL="2743373" indent="0">
               <a:buNone/>
               <a:defRPr sz="1601" b="1"/>
             </a:lvl7pPr>
-            <a:lvl8pPr marL="3200679" indent="0">
+            <a:lvl8pPr marL="3200599" indent="0">
               <a:buNone/>
               <a:defRPr sz="1601" b="1"/>
             </a:lvl8pPr>
-            <a:lvl9pPr marL="3657919" indent="0">
+            <a:lvl9pPr marL="3657827" indent="0">
               <a:buNone/>
               <a:defRPr sz="1601" b="1"/>
             </a:lvl9pPr>
@@ -1495,35 +1496,35 @@
               <a:buNone/>
               <a:defRPr sz="2401" b="1"/>
             </a:lvl1pPr>
-            <a:lvl2pPr marL="457240" indent="0">
+            <a:lvl2pPr marL="457229" indent="0">
               <a:buNone/>
               <a:defRPr sz="2000" b="1"/>
             </a:lvl2pPr>
-            <a:lvl3pPr marL="914480" indent="0">
+            <a:lvl3pPr marL="914457" indent="0">
               <a:buNone/>
               <a:defRPr sz="1799" b="1"/>
             </a:lvl3pPr>
-            <a:lvl4pPr marL="1371720" indent="0">
+            <a:lvl4pPr marL="1371686" indent="0">
               <a:buNone/>
               <a:defRPr sz="1601" b="1"/>
             </a:lvl4pPr>
-            <a:lvl5pPr marL="1828961" indent="0">
+            <a:lvl5pPr marL="1828916" indent="0">
               <a:buNone/>
               <a:defRPr sz="1601" b="1"/>
             </a:lvl5pPr>
-            <a:lvl6pPr marL="2286201" indent="0">
+            <a:lvl6pPr marL="2286144" indent="0">
               <a:buNone/>
               <a:defRPr sz="1601" b="1"/>
             </a:lvl6pPr>
-            <a:lvl7pPr marL="2743441" indent="0">
+            <a:lvl7pPr marL="2743373" indent="0">
               <a:buNone/>
               <a:defRPr sz="1601" b="1"/>
             </a:lvl7pPr>
-            <a:lvl8pPr marL="3200679" indent="0">
+            <a:lvl8pPr marL="3200599" indent="0">
               <a:buNone/>
               <a:defRPr sz="1601" b="1"/>
             </a:lvl8pPr>
-            <a:lvl9pPr marL="3657919" indent="0">
+            <a:lvl9pPr marL="3657827" indent="0">
               <a:buNone/>
               <a:defRPr sz="1601" b="1"/>
             </a:lvl9pPr>
@@ -1611,7 +1612,7 @@
           <a:p>
             <a:fld id="{6A59AB8E-9AF4-1E40-AC94-F82003CC56E0}" type="datetimeFigureOut">
               <a:rPr lang="en-US" smtClean="0"/>
-              <a:t>9/19/17</a:t>
+              <a:t>9/23/17</a:t>
             </a:fld>
             <a:endParaRPr lang="en-US"/>
           </a:p>
@@ -1729,7 +1730,7 @@
           <a:p>
             <a:fld id="{6A59AB8E-9AF4-1E40-AC94-F82003CC56E0}" type="datetimeFigureOut">
               <a:rPr lang="en-US" smtClean="0"/>
-              <a:t>9/19/17</a:t>
+              <a:t>9/23/17</a:t>
             </a:fld>
             <a:endParaRPr lang="en-US"/>
           </a:p>
@@ -1824,7 +1825,7 @@
           <a:p>
             <a:fld id="{6A59AB8E-9AF4-1E40-AC94-F82003CC56E0}" type="datetimeFigureOut">
               <a:rPr lang="en-US" smtClean="0"/>
-              <a:t>9/19/17</a:t>
+              <a:t>9/23/17</a:t>
             </a:fld>
             <a:endParaRPr lang="en-US"/>
           </a:p>
@@ -1914,7 +1915,7 @@
         </p:nvSpPr>
         <p:spPr>
           <a:xfrm>
-            <a:off x="839791" y="457200"/>
+            <a:off x="839792" y="457202"/>
             <a:ext cx="3932237" cy="1600201"/>
           </a:xfrm>
         </p:spPr>
@@ -2031,7 +2032,7 @@
         </p:nvSpPr>
         <p:spPr>
           <a:xfrm>
-            <a:off x="839791" y="2057402"/>
+            <a:off x="839792" y="2057402"/>
             <a:ext cx="3932237" cy="3811587"/>
           </a:xfrm>
         </p:spPr>
@@ -2042,35 +2043,35 @@
               <a:buNone/>
               <a:defRPr sz="1601"/>
             </a:lvl1pPr>
-            <a:lvl2pPr marL="457240" indent="0">
+            <a:lvl2pPr marL="457229" indent="0">
               <a:buNone/>
               <a:defRPr sz="1400"/>
             </a:lvl2pPr>
-            <a:lvl3pPr marL="914480" indent="0">
+            <a:lvl3pPr marL="914457" indent="0">
               <a:buNone/>
               <a:defRPr sz="1199"/>
             </a:lvl3pPr>
-            <a:lvl4pPr marL="1371720" indent="0">
+            <a:lvl4pPr marL="1371686" indent="0">
               <a:buNone/>
               <a:defRPr sz="1001"/>
             </a:lvl4pPr>
-            <a:lvl5pPr marL="1828961" indent="0">
+            <a:lvl5pPr marL="1828916" indent="0">
               <a:buNone/>
               <a:defRPr sz="1001"/>
             </a:lvl5pPr>
-            <a:lvl6pPr marL="2286201" indent="0">
+            <a:lvl6pPr marL="2286144" indent="0">
               <a:buNone/>
               <a:defRPr sz="1001"/>
             </a:lvl6pPr>
-            <a:lvl7pPr marL="2743441" indent="0">
+            <a:lvl7pPr marL="2743373" indent="0">
               <a:buNone/>
               <a:defRPr sz="1001"/>
             </a:lvl7pPr>
-            <a:lvl8pPr marL="3200679" indent="0">
+            <a:lvl8pPr marL="3200599" indent="0">
               <a:buNone/>
               <a:defRPr sz="1001"/>
             </a:lvl8pPr>
-            <a:lvl9pPr marL="3657919" indent="0">
+            <a:lvl9pPr marL="3657827" indent="0">
               <a:buNone/>
               <a:defRPr sz="1001"/>
             </a:lvl9pPr>
@@ -2101,7 +2102,7 @@
           <a:p>
             <a:fld id="{6A59AB8E-9AF4-1E40-AC94-F82003CC56E0}" type="datetimeFigureOut">
               <a:rPr lang="en-US" smtClean="0"/>
-              <a:t>9/19/17</a:t>
+              <a:t>9/23/17</a:t>
             </a:fld>
             <a:endParaRPr lang="en-US"/>
           </a:p>
@@ -2191,7 +2192,7 @@
         </p:nvSpPr>
         <p:spPr>
           <a:xfrm>
-            <a:off x="839791" y="457200"/>
+            <a:off x="839792" y="457202"/>
             <a:ext cx="3932237" cy="1600201"/>
           </a:xfrm>
         </p:spPr>
@@ -2234,35 +2235,35 @@
               <a:buNone/>
               <a:defRPr sz="3201"/>
             </a:lvl1pPr>
-            <a:lvl2pPr marL="457240" indent="0">
+            <a:lvl2pPr marL="457229" indent="0">
               <a:buNone/>
               <a:defRPr sz="2800"/>
             </a:lvl2pPr>
-            <a:lvl3pPr marL="914480" indent="0">
+            <a:lvl3pPr marL="914457" indent="0">
               <a:buNone/>
               <a:defRPr sz="2401"/>
             </a:lvl3pPr>
-            <a:lvl4pPr marL="1371720" indent="0">
+            <a:lvl4pPr marL="1371686" indent="0">
               <a:buNone/>
               <a:defRPr sz="2000"/>
             </a:lvl4pPr>
-            <a:lvl5pPr marL="1828961" indent="0">
+            <a:lvl5pPr marL="1828916" indent="0">
               <a:buNone/>
               <a:defRPr sz="2000"/>
             </a:lvl5pPr>
-            <a:lvl6pPr marL="2286201" indent="0">
+            <a:lvl6pPr marL="2286144" indent="0">
               <a:buNone/>
               <a:defRPr sz="2000"/>
             </a:lvl6pPr>
-            <a:lvl7pPr marL="2743441" indent="0">
+            <a:lvl7pPr marL="2743373" indent="0">
               <a:buNone/>
               <a:defRPr sz="2000"/>
             </a:lvl7pPr>
-            <a:lvl8pPr marL="3200679" indent="0">
+            <a:lvl8pPr marL="3200599" indent="0">
               <a:buNone/>
               <a:defRPr sz="2000"/>
             </a:lvl8pPr>
-            <a:lvl9pPr marL="3657919" indent="0">
+            <a:lvl9pPr marL="3657827" indent="0">
               <a:buNone/>
               <a:defRPr sz="2000"/>
             </a:lvl9pPr>
@@ -2284,7 +2285,7 @@
         </p:nvSpPr>
         <p:spPr>
           <a:xfrm>
-            <a:off x="839791" y="2057402"/>
+            <a:off x="839792" y="2057402"/>
             <a:ext cx="3932237" cy="3811587"/>
           </a:xfrm>
         </p:spPr>
@@ -2295,35 +2296,35 @@
               <a:buNone/>
               <a:defRPr sz="1601"/>
             </a:lvl1pPr>
-            <a:lvl2pPr marL="457240" indent="0">
+            <a:lvl2pPr marL="457229" indent="0">
               <a:buNone/>
               <a:defRPr sz="1400"/>
             </a:lvl2pPr>
-            <a:lvl3pPr marL="914480" indent="0">
+            <a:lvl3pPr marL="914457" indent="0">
               <a:buNone/>
               <a:defRPr sz="1199"/>
             </a:lvl3pPr>
-            <a:lvl4pPr marL="1371720" indent="0">
+            <a:lvl4pPr marL="1371686" indent="0">
               <a:buNone/>
               <a:defRPr sz="1001"/>
             </a:lvl4pPr>
-            <a:lvl5pPr marL="1828961" indent="0">
+            <a:lvl5pPr marL="1828916" indent="0">
               <a:buNone/>
               <a:defRPr sz="1001"/>
             </a:lvl5pPr>
-            <a:lvl6pPr marL="2286201" indent="0">
+            <a:lvl6pPr marL="2286144" indent="0">
               <a:buNone/>
               <a:defRPr sz="1001"/>
             </a:lvl6pPr>
-            <a:lvl7pPr marL="2743441" indent="0">
+            <a:lvl7pPr marL="2743373" indent="0">
               <a:buNone/>
               <a:defRPr sz="1001"/>
             </a:lvl7pPr>
-            <a:lvl8pPr marL="3200679" indent="0">
+            <a:lvl8pPr marL="3200599" indent="0">
               <a:buNone/>
               <a:defRPr sz="1001"/>
             </a:lvl8pPr>
-            <a:lvl9pPr marL="3657919" indent="0">
+            <a:lvl9pPr marL="3657827" indent="0">
               <a:buNone/>
               <a:defRPr sz="1001"/>
             </a:lvl9pPr>
@@ -2354,7 +2355,7 @@
           <a:p>
             <a:fld id="{6A59AB8E-9AF4-1E40-AC94-F82003CC56E0}" type="datetimeFigureOut">
               <a:rPr lang="en-US" smtClean="0"/>
-              <a:t>9/19/17</a:t>
+              <a:t>9/23/17</a:t>
             </a:fld>
             <a:endParaRPr lang="en-US"/>
           </a:p>
@@ -2544,7 +2545,7 @@
         </p:nvSpPr>
         <p:spPr>
           <a:xfrm>
-            <a:off x="838202" y="6356352"/>
+            <a:off x="838203" y="6356354"/>
             <a:ext cx="2743200" cy="365125"/>
           </a:xfrm>
           <a:prstGeom prst="rect">
@@ -2567,7 +2568,7 @@
           <a:p>
             <a:fld id="{6A59AB8E-9AF4-1E40-AC94-F82003CC56E0}" type="datetimeFigureOut">
               <a:rPr lang="en-US" smtClean="0"/>
-              <a:t>9/19/17</a:t>
+              <a:t>9/23/17</a:t>
             </a:fld>
             <a:endParaRPr lang="en-US"/>
           </a:p>
@@ -2585,7 +2586,7 @@
         </p:nvSpPr>
         <p:spPr>
           <a:xfrm>
-            <a:off x="4038602" y="6356352"/>
+            <a:off x="4038604" y="6356354"/>
             <a:ext cx="4114801" cy="365125"/>
           </a:xfrm>
           <a:prstGeom prst="rect">
@@ -2622,7 +2623,7 @@
         </p:nvSpPr>
         <p:spPr>
           <a:xfrm>
-            <a:off x="8610600" y="6356352"/>
+            <a:off x="8610600" y="6356354"/>
             <a:ext cx="2743200" cy="365125"/>
           </a:xfrm>
           <a:prstGeom prst="rect">
@@ -2674,7 +2675,7 @@
   </p:sldLayoutIdLst>
   <p:txStyles>
     <p:titleStyle>
-      <a:lvl1pPr algn="l" defTabSz="914480" rtl="0" eaLnBrk="1" latinLnBrk="0" hangingPunct="1">
+      <a:lvl1pPr algn="l" defTabSz="914457" rtl="0" eaLnBrk="1" latinLnBrk="0" hangingPunct="1">
         <a:lnSpc>
           <a:spcPct val="90000"/>
         </a:lnSpc>
@@ -2693,7 +2694,7 @@
       </a:lvl1pPr>
     </p:titleStyle>
     <p:bodyStyle>
-      <a:lvl1pPr marL="228620" indent="-228620" algn="l" defTabSz="914480" rtl="0" eaLnBrk="1" latinLnBrk="0" hangingPunct="1">
+      <a:lvl1pPr marL="228614" indent="-228614" algn="l" defTabSz="914457" rtl="0" eaLnBrk="1" latinLnBrk="0" hangingPunct="1">
         <a:lnSpc>
           <a:spcPct val="90000"/>
         </a:lnSpc>
@@ -2711,7 +2712,7 @@
           <a:cs typeface="+mn-cs"/>
         </a:defRPr>
       </a:lvl1pPr>
-      <a:lvl2pPr marL="685860" indent="-228620" algn="l" defTabSz="914480" rtl="0" eaLnBrk="1" latinLnBrk="0" hangingPunct="1">
+      <a:lvl2pPr marL="685843" indent="-228614" algn="l" defTabSz="914457" rtl="0" eaLnBrk="1" latinLnBrk="0" hangingPunct="1">
         <a:lnSpc>
           <a:spcPct val="90000"/>
         </a:lnSpc>
@@ -2729,7 +2730,7 @@
           <a:cs typeface="+mn-cs"/>
         </a:defRPr>
       </a:lvl2pPr>
-      <a:lvl3pPr marL="1143100" indent="-228620" algn="l" defTabSz="914480" rtl="0" eaLnBrk="1" latinLnBrk="0" hangingPunct="1">
+      <a:lvl3pPr marL="1143071" indent="-228614" algn="l" defTabSz="914457" rtl="0" eaLnBrk="1" latinLnBrk="0" hangingPunct="1">
         <a:lnSpc>
           <a:spcPct val="90000"/>
         </a:lnSpc>
@@ -2747,7 +2748,7 @@
           <a:cs typeface="+mn-cs"/>
         </a:defRPr>
       </a:lvl3pPr>
-      <a:lvl4pPr marL="1600341" indent="-228620" algn="l" defTabSz="914480" rtl="0" eaLnBrk="1" latinLnBrk="0" hangingPunct="1">
+      <a:lvl4pPr marL="1600301" indent="-228614" algn="l" defTabSz="914457" rtl="0" eaLnBrk="1" latinLnBrk="0" hangingPunct="1">
         <a:lnSpc>
           <a:spcPct val="90000"/>
         </a:lnSpc>
@@ -2765,7 +2766,7 @@
           <a:cs typeface="+mn-cs"/>
         </a:defRPr>
       </a:lvl4pPr>
-      <a:lvl5pPr marL="2057581" indent="-228620" algn="l" defTabSz="914480" rtl="0" eaLnBrk="1" latinLnBrk="0" hangingPunct="1">
+      <a:lvl5pPr marL="2057530" indent="-228614" algn="l" defTabSz="914457" rtl="0" eaLnBrk="1" latinLnBrk="0" hangingPunct="1">
         <a:lnSpc>
           <a:spcPct val="90000"/>
         </a:lnSpc>
@@ -2783,7 +2784,7 @@
           <a:cs typeface="+mn-cs"/>
         </a:defRPr>
       </a:lvl5pPr>
-      <a:lvl6pPr marL="2514821" indent="-228620" algn="l" defTabSz="914480" rtl="0" eaLnBrk="1" latinLnBrk="0" hangingPunct="1">
+      <a:lvl6pPr marL="2514758" indent="-228614" algn="l" defTabSz="914457" rtl="0" eaLnBrk="1" latinLnBrk="0" hangingPunct="1">
         <a:lnSpc>
           <a:spcPct val="90000"/>
         </a:lnSpc>
@@ -2801,7 +2802,7 @@
           <a:cs typeface="+mn-cs"/>
         </a:defRPr>
       </a:lvl6pPr>
-      <a:lvl7pPr marL="2972059" indent="-228620" algn="l" defTabSz="914480" rtl="0" eaLnBrk="1" latinLnBrk="0" hangingPunct="1">
+      <a:lvl7pPr marL="2971984" indent="-228614" algn="l" defTabSz="914457" rtl="0" eaLnBrk="1" latinLnBrk="0" hangingPunct="1">
         <a:lnSpc>
           <a:spcPct val="90000"/>
         </a:lnSpc>
@@ -2819,7 +2820,7 @@
           <a:cs typeface="+mn-cs"/>
         </a:defRPr>
       </a:lvl7pPr>
-      <a:lvl8pPr marL="3429299" indent="-228620" algn="l" defTabSz="914480" rtl="0" eaLnBrk="1" latinLnBrk="0" hangingPunct="1">
+      <a:lvl8pPr marL="3429213" indent="-228614" algn="l" defTabSz="914457" rtl="0" eaLnBrk="1" latinLnBrk="0" hangingPunct="1">
         <a:lnSpc>
           <a:spcPct val="90000"/>
         </a:lnSpc>
@@ -2837,7 +2838,7 @@
           <a:cs typeface="+mn-cs"/>
         </a:defRPr>
       </a:lvl8pPr>
-      <a:lvl9pPr marL="3886539" indent="-228620" algn="l" defTabSz="914480" rtl="0" eaLnBrk="1" latinLnBrk="0" hangingPunct="1">
+      <a:lvl9pPr marL="3886442" indent="-228614" algn="l" defTabSz="914457" rtl="0" eaLnBrk="1" latinLnBrk="0" hangingPunct="1">
         <a:lnSpc>
           <a:spcPct val="90000"/>
         </a:lnSpc>
@@ -2860,7 +2861,7 @@
       <a:defPPr>
         <a:defRPr lang="en-US"/>
       </a:defPPr>
-      <a:lvl1pPr marL="0" algn="l" defTabSz="914480" rtl="0" eaLnBrk="1" latinLnBrk="0" hangingPunct="1">
+      <a:lvl1pPr marL="0" algn="l" defTabSz="914457" rtl="0" eaLnBrk="1" latinLnBrk="0" hangingPunct="1">
         <a:defRPr sz="1799" kern="1200">
           <a:solidFill>
             <a:schemeClr val="tx1"/>
@@ -2870,7 +2871,7 @@
           <a:cs typeface="+mn-cs"/>
         </a:defRPr>
       </a:lvl1pPr>
-      <a:lvl2pPr marL="457240" algn="l" defTabSz="914480" rtl="0" eaLnBrk="1" latinLnBrk="0" hangingPunct="1">
+      <a:lvl2pPr marL="457229" algn="l" defTabSz="914457" rtl="0" eaLnBrk="1" latinLnBrk="0" hangingPunct="1">
         <a:defRPr sz="1799" kern="1200">
           <a:solidFill>
             <a:schemeClr val="tx1"/>
@@ -2880,7 +2881,7 @@
           <a:cs typeface="+mn-cs"/>
         </a:defRPr>
       </a:lvl2pPr>
-      <a:lvl3pPr marL="914480" algn="l" defTabSz="914480" rtl="0" eaLnBrk="1" latinLnBrk="0" hangingPunct="1">
+      <a:lvl3pPr marL="914457" algn="l" defTabSz="914457" rtl="0" eaLnBrk="1" latinLnBrk="0" hangingPunct="1">
         <a:defRPr sz="1799" kern="1200">
           <a:solidFill>
             <a:schemeClr val="tx1"/>
@@ -2890,7 +2891,7 @@
           <a:cs typeface="+mn-cs"/>
         </a:defRPr>
       </a:lvl3pPr>
-      <a:lvl4pPr marL="1371720" algn="l" defTabSz="914480" rtl="0" eaLnBrk="1" latinLnBrk="0" hangingPunct="1">
+      <a:lvl4pPr marL="1371686" algn="l" defTabSz="914457" rtl="0" eaLnBrk="1" latinLnBrk="0" hangingPunct="1">
         <a:defRPr sz="1799" kern="1200">
           <a:solidFill>
             <a:schemeClr val="tx1"/>
@@ -2900,7 +2901,7 @@
           <a:cs typeface="+mn-cs"/>
         </a:defRPr>
       </a:lvl4pPr>
-      <a:lvl5pPr marL="1828961" algn="l" defTabSz="914480" rtl="0" eaLnBrk="1" latinLnBrk="0" hangingPunct="1">
+      <a:lvl5pPr marL="1828916" algn="l" defTabSz="914457" rtl="0" eaLnBrk="1" latinLnBrk="0" hangingPunct="1">
         <a:defRPr sz="1799" kern="1200">
           <a:solidFill>
             <a:schemeClr val="tx1"/>
@@ -2910,7 +2911,7 @@
           <a:cs typeface="+mn-cs"/>
         </a:defRPr>
       </a:lvl5pPr>
-      <a:lvl6pPr marL="2286201" algn="l" defTabSz="914480" rtl="0" eaLnBrk="1" latinLnBrk="0" hangingPunct="1">
+      <a:lvl6pPr marL="2286144" algn="l" defTabSz="914457" rtl="0" eaLnBrk="1" latinLnBrk="0" hangingPunct="1">
         <a:defRPr sz="1799" kern="1200">
           <a:solidFill>
             <a:schemeClr val="tx1"/>
@@ -2920,7 +2921,7 @@
           <a:cs typeface="+mn-cs"/>
         </a:defRPr>
       </a:lvl6pPr>
-      <a:lvl7pPr marL="2743441" algn="l" defTabSz="914480" rtl="0" eaLnBrk="1" latinLnBrk="0" hangingPunct="1">
+      <a:lvl7pPr marL="2743373" algn="l" defTabSz="914457" rtl="0" eaLnBrk="1" latinLnBrk="0" hangingPunct="1">
         <a:defRPr sz="1799" kern="1200">
           <a:solidFill>
             <a:schemeClr val="tx1"/>
@@ -2930,7 +2931,7 @@
           <a:cs typeface="+mn-cs"/>
         </a:defRPr>
       </a:lvl7pPr>
-      <a:lvl8pPr marL="3200679" algn="l" defTabSz="914480" rtl="0" eaLnBrk="1" latinLnBrk="0" hangingPunct="1">
+      <a:lvl8pPr marL="3200599" algn="l" defTabSz="914457" rtl="0" eaLnBrk="1" latinLnBrk="0" hangingPunct="1">
         <a:defRPr sz="1799" kern="1200">
           <a:solidFill>
             <a:schemeClr val="tx1"/>
@@ -2940,7 +2941,7 @@
           <a:cs typeface="+mn-cs"/>
         </a:defRPr>
       </a:lvl8pPr>
-      <a:lvl9pPr marL="3657919" algn="l" defTabSz="914480" rtl="0" eaLnBrk="1" latinLnBrk="0" hangingPunct="1">
+      <a:lvl9pPr marL="3657827" algn="l" defTabSz="914457" rtl="0" eaLnBrk="1" latinLnBrk="0" hangingPunct="1">
         <a:defRPr sz="1799" kern="1200">
           <a:solidFill>
             <a:schemeClr val="tx1"/>
@@ -2988,7 +2989,7 @@
         </p:nvSpPr>
         <p:spPr>
           <a:xfrm>
-            <a:off x="121020" y="147925"/>
+            <a:off x="121021" y="147926"/>
             <a:ext cx="4733369" cy="4733361"/>
           </a:xfrm>
           <a:prstGeom prst="roundRect">
@@ -3027,7 +3028,7 @@
           <a:lstStyle/>
           <a:p>
             <a:pPr algn="ctr"/>
-            <a:endParaRPr lang="en-US" sz="918"/>
+            <a:endParaRPr lang="en-US" sz="919"/>
           </a:p>
         </p:txBody>
       </p:sp>
@@ -3039,7 +3040,7 @@
         </p:nvSpPr>
         <p:spPr>
           <a:xfrm>
-            <a:off x="1479184" y="1506072"/>
+            <a:off x="1479185" y="1506073"/>
             <a:ext cx="1008531" cy="1008531"/>
           </a:xfrm>
           <a:prstGeom prst="roundRect">
@@ -3078,7 +3079,7 @@
           <a:lstStyle/>
           <a:p>
             <a:pPr algn="ctr"/>
-            <a:endParaRPr lang="en-US" sz="918"/>
+            <a:endParaRPr lang="en-US" sz="919"/>
           </a:p>
         </p:txBody>
       </p:sp>
@@ -3090,7 +3091,7 @@
         </p:nvSpPr>
         <p:spPr>
           <a:xfrm>
-            <a:off x="2487715" y="2514603"/>
+            <a:off x="2487716" y="2514604"/>
             <a:ext cx="1008531" cy="1008531"/>
           </a:xfrm>
           <a:prstGeom prst="roundRect">
@@ -3129,7 +3130,7 @@
           <a:lstStyle/>
           <a:p>
             <a:pPr algn="ctr"/>
-            <a:endParaRPr lang="en-US" sz="918"/>
+            <a:endParaRPr lang="en-US" sz="919"/>
           </a:p>
         </p:txBody>
       </p:sp>
@@ -3141,7 +3142,7 @@
         </p:nvSpPr>
         <p:spPr>
           <a:xfrm>
-            <a:off x="497549" y="488579"/>
+            <a:off x="497549" y="488580"/>
             <a:ext cx="1008531" cy="1008531"/>
           </a:xfrm>
           <a:prstGeom prst="roundRect">
@@ -3180,7 +3181,7 @@
           <a:lstStyle/>
           <a:p>
             <a:pPr algn="ctr"/>
-            <a:endParaRPr lang="en-US" sz="918"/>
+            <a:endParaRPr lang="en-US" sz="919"/>
           </a:p>
         </p:txBody>
       </p:sp>
@@ -3192,8 +3193,8 @@
         </p:nvSpPr>
         <p:spPr>
           <a:xfrm>
-            <a:off x="2514611" y="296781"/>
-            <a:ext cx="2420470" cy="2400657"/>
+            <a:off x="2514611" y="296782"/>
+            <a:ext cx="2420471" cy="2400657"/>
           </a:xfrm>
           <a:prstGeom prst="rect">
             <a:avLst/>
@@ -3215,7 +3216,7 @@
               <a:t>2</a:t>
             </a:r>
             <a:r>
-              <a:rPr lang="en-US" sz="15000" b="1" dirty="0" smtClean="0">
+              <a:rPr lang="en-US" sz="15000" b="1" dirty="0">
                 <a:solidFill>
                   <a:schemeClr val="bg1"/>
                 </a:solidFill>
@@ -3276,7 +3277,7 @@
         </p:nvSpPr>
         <p:spPr>
           <a:xfrm>
-            <a:off x="121020" y="147925"/>
+            <a:off x="121021" y="147926"/>
             <a:ext cx="4733369" cy="4733361"/>
           </a:xfrm>
           <a:prstGeom prst="roundRect">
@@ -3315,7 +3316,7 @@
           <a:lstStyle/>
           <a:p>
             <a:pPr algn="ctr"/>
-            <a:endParaRPr lang="en-US" sz="918"/>
+            <a:endParaRPr lang="en-US" sz="919"/>
           </a:p>
         </p:txBody>
       </p:sp>
@@ -3327,7 +3328,7 @@
         </p:nvSpPr>
         <p:spPr>
           <a:xfrm>
-            <a:off x="1479184" y="1506072"/>
+            <a:off x="1479185" y="1506073"/>
             <a:ext cx="1008531" cy="1008531"/>
           </a:xfrm>
           <a:prstGeom prst="roundRect">
@@ -3366,7 +3367,7 @@
           <a:lstStyle/>
           <a:p>
             <a:pPr algn="ctr"/>
-            <a:endParaRPr lang="en-US" sz="918"/>
+            <a:endParaRPr lang="en-US" sz="919"/>
           </a:p>
         </p:txBody>
       </p:sp>
@@ -3378,7 +3379,7 @@
         </p:nvSpPr>
         <p:spPr>
           <a:xfrm>
-            <a:off x="3496241" y="3523135"/>
+            <a:off x="3496241" y="3523136"/>
             <a:ext cx="1008531" cy="1008531"/>
           </a:xfrm>
           <a:prstGeom prst="roundRect">
@@ -3417,7 +3418,7 @@
           <a:lstStyle/>
           <a:p>
             <a:pPr algn="ctr"/>
-            <a:endParaRPr lang="en-US" sz="918"/>
+            <a:endParaRPr lang="en-US" sz="919"/>
           </a:p>
         </p:txBody>
       </p:sp>
@@ -3429,7 +3430,7 @@
         </p:nvSpPr>
         <p:spPr>
           <a:xfrm>
-            <a:off x="2487715" y="2514603"/>
+            <a:off x="2487716" y="2514604"/>
             <a:ext cx="1008531" cy="1008531"/>
           </a:xfrm>
           <a:prstGeom prst="roundRect">
@@ -3468,7 +3469,7 @@
           <a:lstStyle/>
           <a:p>
             <a:pPr algn="ctr"/>
-            <a:endParaRPr lang="en-US" sz="918"/>
+            <a:endParaRPr lang="en-US" sz="919"/>
           </a:p>
         </p:txBody>
       </p:sp>
@@ -3480,7 +3481,7 @@
         </p:nvSpPr>
         <p:spPr>
           <a:xfrm>
-            <a:off x="497549" y="488579"/>
+            <a:off x="497549" y="488580"/>
             <a:ext cx="1008531" cy="1008531"/>
           </a:xfrm>
           <a:prstGeom prst="roundRect">
@@ -3519,7 +3520,7 @@
           <a:lstStyle/>
           <a:p>
             <a:pPr algn="ctr"/>
-            <a:endParaRPr lang="en-US" sz="918"/>
+            <a:endParaRPr lang="en-US" sz="919"/>
           </a:p>
         </p:txBody>
       </p:sp>
@@ -3531,8 +3532,8 @@
         </p:nvSpPr>
         <p:spPr>
           <a:xfrm>
-            <a:off x="2514611" y="296781"/>
-            <a:ext cx="2420470" cy="2400657"/>
+            <a:off x="2514611" y="296782"/>
+            <a:ext cx="2420471" cy="2400657"/>
           </a:xfrm>
           <a:prstGeom prst="rect">
             <a:avLst/>
@@ -3546,7 +3547,7 @@
           <a:lstStyle/>
           <a:p>
             <a:r>
-              <a:rPr lang="en-US" sz="15000" b="1" dirty="0" smtClean="0">
+              <a:rPr lang="en-US" sz="15000" b="1" dirty="0">
                 <a:solidFill>
                   <a:schemeClr val="bg1"/>
                 </a:solidFill>
@@ -3607,7 +3608,7 @@
         </p:nvSpPr>
         <p:spPr>
           <a:xfrm>
-            <a:off x="121020" y="147925"/>
+            <a:off x="121021" y="147926"/>
             <a:ext cx="4733369" cy="4733361"/>
           </a:xfrm>
           <a:prstGeom prst="roundRect">
@@ -3646,7 +3647,7 @@
           <a:lstStyle/>
           <a:p>
             <a:pPr algn="ctr"/>
-            <a:endParaRPr lang="en-US" sz="918"/>
+            <a:endParaRPr lang="en-US" sz="919"/>
           </a:p>
         </p:txBody>
       </p:sp>
@@ -3658,7 +3659,7 @@
         </p:nvSpPr>
         <p:spPr>
           <a:xfrm>
-            <a:off x="1479184" y="1506072"/>
+            <a:off x="1479185" y="1506073"/>
             <a:ext cx="1008531" cy="1008531"/>
           </a:xfrm>
           <a:prstGeom prst="roundRect">
@@ -3697,7 +3698,7 @@
           <a:lstStyle/>
           <a:p>
             <a:pPr algn="ctr"/>
-            <a:endParaRPr lang="en-US" sz="918"/>
+            <a:endParaRPr lang="en-US" sz="919"/>
           </a:p>
         </p:txBody>
       </p:sp>
@@ -3709,7 +3710,7 @@
         </p:nvSpPr>
         <p:spPr>
           <a:xfrm>
-            <a:off x="3496241" y="3523135"/>
+            <a:off x="3496241" y="3523136"/>
             <a:ext cx="1008531" cy="1008531"/>
           </a:xfrm>
           <a:prstGeom prst="roundRect">
@@ -3748,7 +3749,7 @@
           <a:lstStyle/>
           <a:p>
             <a:pPr algn="ctr"/>
-            <a:endParaRPr lang="en-US" sz="918"/>
+            <a:endParaRPr lang="en-US" sz="919"/>
           </a:p>
         </p:txBody>
       </p:sp>
@@ -3760,7 +3761,7 @@
         </p:nvSpPr>
         <p:spPr>
           <a:xfrm>
-            <a:off x="2487715" y="2514603"/>
+            <a:off x="2487716" y="2514604"/>
             <a:ext cx="1008531" cy="1008531"/>
           </a:xfrm>
           <a:prstGeom prst="roundRect">
@@ -3799,7 +3800,7 @@
           <a:lstStyle/>
           <a:p>
             <a:pPr algn="ctr"/>
-            <a:endParaRPr lang="en-US" sz="918"/>
+            <a:endParaRPr lang="en-US" sz="919"/>
           </a:p>
         </p:txBody>
       </p:sp>
@@ -3811,7 +3812,7 @@
         </p:nvSpPr>
         <p:spPr>
           <a:xfrm>
-            <a:off x="497549" y="488579"/>
+            <a:off x="497549" y="488580"/>
             <a:ext cx="1008531" cy="1008531"/>
           </a:xfrm>
           <a:prstGeom prst="roundRect">
@@ -3850,7 +3851,7 @@
           <a:lstStyle/>
           <a:p>
             <a:pPr algn="ctr"/>
-            <a:endParaRPr lang="en-US" sz="918"/>
+            <a:endParaRPr lang="en-US" sz="919"/>
           </a:p>
         </p:txBody>
       </p:sp>
@@ -3862,8 +3863,8 @@
         </p:nvSpPr>
         <p:spPr>
           <a:xfrm>
-            <a:off x="2514611" y="296781"/>
-            <a:ext cx="2420470" cy="2400657"/>
+            <a:off x="2514611" y="296782"/>
+            <a:ext cx="2420471" cy="2400657"/>
           </a:xfrm>
           <a:prstGeom prst="rect">
             <a:avLst/>
@@ -3885,7 +3886,7 @@
               <a:t>1</a:t>
             </a:r>
             <a:r>
-              <a:rPr lang="en-US" sz="15000" b="1" dirty="0" smtClean="0">
+              <a:rPr lang="en-US" sz="15000" b="1" dirty="0">
                 <a:solidFill>
                   <a:schemeClr val="bg1"/>
                 </a:solidFill>
@@ -3908,7 +3909,7 @@
         </p:nvSpPr>
         <p:spPr>
           <a:xfrm>
-            <a:off x="1398492" y="3523135"/>
+            <a:off x="1398493" y="3523136"/>
             <a:ext cx="1008531" cy="1008531"/>
           </a:xfrm>
           <a:prstGeom prst="roundRect">
@@ -3947,7 +3948,7 @@
           <a:lstStyle/>
           <a:p>
             <a:pPr algn="ctr"/>
-            <a:endParaRPr lang="en-US" sz="918"/>
+            <a:endParaRPr lang="en-US" sz="919"/>
           </a:p>
         </p:txBody>
       </p:sp>
@@ -3997,7 +3998,7 @@
         </p:nvSpPr>
         <p:spPr>
           <a:xfrm>
-            <a:off x="121020" y="147925"/>
+            <a:off x="121021" y="147926"/>
             <a:ext cx="4733369" cy="4733361"/>
           </a:xfrm>
           <a:prstGeom prst="roundRect">
@@ -4036,7 +4037,7 @@
           <a:lstStyle/>
           <a:p>
             <a:pPr algn="ctr"/>
-            <a:endParaRPr lang="en-US" sz="918"/>
+            <a:endParaRPr lang="en-US" sz="919"/>
           </a:p>
         </p:txBody>
       </p:sp>
@@ -4048,7 +4049,7 @@
         </p:nvSpPr>
         <p:spPr>
           <a:xfrm>
-            <a:off x="1479184" y="1506072"/>
+            <a:off x="1479185" y="1506073"/>
             <a:ext cx="1008531" cy="1008531"/>
           </a:xfrm>
           <a:prstGeom prst="roundRect">
@@ -4087,7 +4088,7 @@
           <a:lstStyle/>
           <a:p>
             <a:pPr algn="ctr"/>
-            <a:endParaRPr lang="en-US" sz="918"/>
+            <a:endParaRPr lang="en-US" sz="919"/>
           </a:p>
         </p:txBody>
       </p:sp>
@@ -4099,7 +4100,7 @@
         </p:nvSpPr>
         <p:spPr>
           <a:xfrm>
-            <a:off x="3496241" y="3523135"/>
+            <a:off x="3496241" y="3523136"/>
             <a:ext cx="1008531" cy="1008531"/>
           </a:xfrm>
           <a:prstGeom prst="roundRect">
@@ -4138,7 +4139,7 @@
           <a:lstStyle/>
           <a:p>
             <a:pPr algn="ctr"/>
-            <a:endParaRPr lang="en-US" sz="918"/>
+            <a:endParaRPr lang="en-US" sz="919"/>
           </a:p>
         </p:txBody>
       </p:sp>
@@ -4150,7 +4151,7 @@
         </p:nvSpPr>
         <p:spPr>
           <a:xfrm>
-            <a:off x="2487715" y="2514603"/>
+            <a:off x="2487716" y="2514604"/>
             <a:ext cx="1008531" cy="1008531"/>
           </a:xfrm>
           <a:prstGeom prst="roundRect">
@@ -4189,7 +4190,7 @@
           <a:lstStyle/>
           <a:p>
             <a:pPr algn="ctr"/>
-            <a:endParaRPr lang="en-US" sz="918"/>
+            <a:endParaRPr lang="en-US" sz="919"/>
           </a:p>
         </p:txBody>
       </p:sp>
@@ -4201,7 +4202,7 @@
         </p:nvSpPr>
         <p:spPr>
           <a:xfrm>
-            <a:off x="497549" y="488579"/>
+            <a:off x="497549" y="488580"/>
             <a:ext cx="1008531" cy="1008531"/>
           </a:xfrm>
           <a:prstGeom prst="roundRect">
@@ -4240,7 +4241,7 @@
           <a:lstStyle/>
           <a:p>
             <a:pPr algn="ctr"/>
-            <a:endParaRPr lang="en-US" sz="918"/>
+            <a:endParaRPr lang="en-US" sz="919"/>
           </a:p>
         </p:txBody>
       </p:sp>
@@ -4252,8 +4253,8 @@
         </p:nvSpPr>
         <p:spPr>
           <a:xfrm>
-            <a:off x="2514611" y="296781"/>
-            <a:ext cx="2420470" cy="2400657"/>
+            <a:off x="2514611" y="296782"/>
+            <a:ext cx="2420471" cy="2400657"/>
           </a:xfrm>
           <a:prstGeom prst="rect">
             <a:avLst/>
@@ -4267,7 +4268,7 @@
           <a:lstStyle/>
           <a:p>
             <a:r>
-              <a:rPr lang="en-US" sz="15000" b="1" dirty="0" smtClean="0">
+              <a:rPr lang="en-US" sz="15000" b="1" dirty="0">
                 <a:solidFill>
                   <a:schemeClr val="bg1"/>
                 </a:solidFill>
@@ -4290,7 +4291,7 @@
         </p:nvSpPr>
         <p:spPr>
           <a:xfrm>
-            <a:off x="1398492" y="3523135"/>
+            <a:off x="1398493" y="3523136"/>
             <a:ext cx="1008531" cy="1008531"/>
           </a:xfrm>
           <a:prstGeom prst="roundRect">
@@ -4329,7 +4330,7 @@
           <a:lstStyle/>
           <a:p>
             <a:pPr algn="ctr"/>
-            <a:endParaRPr lang="en-US" sz="918"/>
+            <a:endParaRPr lang="en-US" sz="919"/>
           </a:p>
         </p:txBody>
       </p:sp>
@@ -4341,7 +4342,7 @@
         </p:nvSpPr>
         <p:spPr>
           <a:xfrm>
-            <a:off x="389961" y="2505642"/>
+            <a:off x="389961" y="2505643"/>
             <a:ext cx="1008531" cy="1008531"/>
           </a:xfrm>
           <a:prstGeom prst="roundRect">
@@ -4383,7 +4384,7 @@
           <a:lstStyle/>
           <a:p>
             <a:pPr algn="ctr"/>
-            <a:endParaRPr lang="en-US" sz="918"/>
+            <a:endParaRPr lang="en-US" sz="919"/>
           </a:p>
         </p:txBody>
       </p:sp>
@@ -4391,6 +4392,483 @@
     <p:extLst>
       <p:ext uri="{BB962C8B-B14F-4D97-AF65-F5344CB8AC3E}">
         <p14:creationId xmlns:p14="http://schemas.microsoft.com/office/powerpoint/2010/main" val="2045098713"/>
+      </p:ext>
+    </p:extLst>
+  </p:cSld>
+  <p:clrMapOvr>
+    <a:masterClrMapping/>
+  </p:clrMapOvr>
+</p:sld>
+</file>
+
+<file path=ppt/slides/slide5.xml><?xml version="1.0" encoding="utf-8"?>
+<p:sld xmlns:a="http://schemas.openxmlformats.org/drawingml/2006/main" xmlns:r="http://schemas.openxmlformats.org/officeDocument/2006/relationships" xmlns:p="http://schemas.openxmlformats.org/presentationml/2006/main">
+  <p:cSld>
+    <p:bg>
+      <p:bgPr>
+        <a:solidFill>
+          <a:schemeClr val="tx1"/>
+        </a:solidFill>
+        <a:effectLst/>
+      </p:bgPr>
+    </p:bg>
+    <p:spTree>
+      <p:nvGrpSpPr>
+        <p:cNvPr id="1" name=""/>
+        <p:cNvGrpSpPr/>
+        <p:nvPr/>
+      </p:nvGrpSpPr>
+      <p:grpSpPr>
+        <a:xfrm>
+          <a:off x="0" y="0"/>
+          <a:ext cx="0" cy="0"/>
+          <a:chOff x="0" y="0"/>
+          <a:chExt cx="0" cy="0"/>
+        </a:xfrm>
+      </p:grpSpPr>
+      <p:sp>
+        <p:nvSpPr>
+          <p:cNvPr id="4" name="Rounded Rectangle 3"/>
+          <p:cNvSpPr/>
+          <p:nvPr/>
+        </p:nvSpPr>
+        <p:spPr>
+          <a:xfrm>
+            <a:off x="121021" y="147926"/>
+            <a:ext cx="4733369" cy="4733361"/>
+          </a:xfrm>
+          <a:prstGeom prst="roundRect">
+            <a:avLst/>
+          </a:prstGeom>
+          <a:noFill/>
+          <a:ln w="63500">
+            <a:solidFill>
+              <a:schemeClr val="bg1"/>
+            </a:solidFill>
+          </a:ln>
+        </p:spPr>
+        <p:style>
+          <a:lnRef idx="2">
+            <a:schemeClr val="accent1">
+              <a:shade val="50000"/>
+            </a:schemeClr>
+          </a:lnRef>
+          <a:fillRef idx="1">
+            <a:schemeClr val="accent1"/>
+          </a:fillRef>
+          <a:effectRef idx="0">
+            <a:schemeClr val="accent1"/>
+          </a:effectRef>
+          <a:fontRef idx="minor">
+            <a:schemeClr val="lt1"/>
+          </a:fontRef>
+        </p:style>
+        <p:txBody>
+          <a:bodyPr rot="0" spcFirstLastPara="0" vertOverflow="overflow" horzOverflow="overflow" vert="horz" wrap="square" lIns="91440" tIns="45724" rIns="91440" bIns="45724" numCol="1" spcCol="0" rtlCol="0" fromWordArt="0" anchor="ctr" anchorCtr="0" forceAA="0" compatLnSpc="1">
+            <a:prstTxWarp prst="textNoShape">
+              <a:avLst/>
+            </a:prstTxWarp>
+            <a:noAutofit/>
+          </a:bodyPr>
+          <a:lstStyle/>
+          <a:p>
+            <a:pPr algn="ctr"/>
+            <a:endParaRPr lang="en-US" sz="919"/>
+          </a:p>
+        </p:txBody>
+      </p:sp>
+      <p:sp>
+        <p:nvSpPr>
+          <p:cNvPr id="5" name="Rounded Rectangle 4"/>
+          <p:cNvSpPr/>
+          <p:nvPr/>
+        </p:nvSpPr>
+        <p:spPr>
+          <a:xfrm>
+            <a:off x="1479185" y="1506073"/>
+            <a:ext cx="1008531" cy="1008531"/>
+          </a:xfrm>
+          <a:prstGeom prst="roundRect">
+            <a:avLst/>
+          </a:prstGeom>
+          <a:solidFill>
+            <a:srgbClr val="00B050"/>
+          </a:solidFill>
+          <a:ln>
+            <a:noFill/>
+          </a:ln>
+        </p:spPr>
+        <p:style>
+          <a:lnRef idx="2">
+            <a:schemeClr val="accent1">
+              <a:shade val="50000"/>
+            </a:schemeClr>
+          </a:lnRef>
+          <a:fillRef idx="1">
+            <a:schemeClr val="accent1"/>
+          </a:fillRef>
+          <a:effectRef idx="0">
+            <a:schemeClr val="accent1"/>
+          </a:effectRef>
+          <a:fontRef idx="minor">
+            <a:schemeClr val="lt1"/>
+          </a:fontRef>
+        </p:style>
+        <p:txBody>
+          <a:bodyPr rot="0" spcFirstLastPara="0" vertOverflow="overflow" horzOverflow="overflow" vert="horz" wrap="square" lIns="91440" tIns="45724" rIns="91440" bIns="45724" numCol="1" spcCol="0" rtlCol="0" fromWordArt="0" anchor="ctr" anchorCtr="0" forceAA="0" compatLnSpc="1">
+            <a:prstTxWarp prst="textNoShape">
+              <a:avLst/>
+            </a:prstTxWarp>
+            <a:noAutofit/>
+          </a:bodyPr>
+          <a:lstStyle/>
+          <a:p>
+            <a:pPr algn="ctr"/>
+            <a:r>
+              <a:rPr lang="en-US" sz="6000" dirty="0"/>
+              <a:t>O</a:t>
+            </a:r>
+            <a:endParaRPr lang="en-US" sz="6000" dirty="0"/>
+          </a:p>
+        </p:txBody>
+      </p:sp>
+      <p:sp>
+        <p:nvSpPr>
+          <p:cNvPr id="6" name="Rounded Rectangle 5"/>
+          <p:cNvSpPr/>
+          <p:nvPr/>
+        </p:nvSpPr>
+        <p:spPr>
+          <a:xfrm>
+            <a:off x="3496241" y="3523136"/>
+            <a:ext cx="1008531" cy="1008531"/>
+          </a:xfrm>
+          <a:prstGeom prst="roundRect">
+            <a:avLst/>
+          </a:prstGeom>
+          <a:solidFill>
+            <a:srgbClr val="FF43FF"/>
+          </a:solidFill>
+          <a:ln>
+            <a:noFill/>
+          </a:ln>
+        </p:spPr>
+        <p:style>
+          <a:lnRef idx="2">
+            <a:schemeClr val="accent1">
+              <a:shade val="50000"/>
+            </a:schemeClr>
+          </a:lnRef>
+          <a:fillRef idx="1">
+            <a:schemeClr val="accent1"/>
+          </a:fillRef>
+          <a:effectRef idx="0">
+            <a:schemeClr val="accent1"/>
+          </a:effectRef>
+          <a:fontRef idx="minor">
+            <a:schemeClr val="lt1"/>
+          </a:fontRef>
+        </p:style>
+        <p:txBody>
+          <a:bodyPr rot="0" spcFirstLastPara="0" vertOverflow="overflow" horzOverflow="overflow" vert="horz" wrap="square" lIns="91440" tIns="45724" rIns="91440" bIns="45724" numCol="1" spcCol="0" rtlCol="0" fromWordArt="0" anchor="ctr" anchorCtr="0" forceAA="0" compatLnSpc="1">
+            <a:prstTxWarp prst="textNoShape">
+              <a:avLst/>
+            </a:prstTxWarp>
+            <a:noAutofit/>
+          </a:bodyPr>
+          <a:lstStyle/>
+          <a:p>
+            <a:pPr algn="ctr"/>
+            <a:r>
+              <a:rPr lang="en-US" sz="6000" dirty="0"/>
+              <a:t>I</a:t>
+            </a:r>
+            <a:endParaRPr lang="en-US" sz="6000" dirty="0"/>
+          </a:p>
+        </p:txBody>
+      </p:sp>
+      <p:sp>
+        <p:nvSpPr>
+          <p:cNvPr id="7" name="Rounded Rectangle 6"/>
+          <p:cNvSpPr/>
+          <p:nvPr/>
+        </p:nvSpPr>
+        <p:spPr>
+          <a:xfrm>
+            <a:off x="2487716" y="2514604"/>
+            <a:ext cx="1008531" cy="1008531"/>
+          </a:xfrm>
+          <a:prstGeom prst="roundRect">
+            <a:avLst/>
+          </a:prstGeom>
+          <a:solidFill>
+            <a:srgbClr val="7030A0"/>
+          </a:solidFill>
+          <a:ln>
+            <a:noFill/>
+          </a:ln>
+        </p:spPr>
+        <p:style>
+          <a:lnRef idx="2">
+            <a:schemeClr val="accent1">
+              <a:shade val="50000"/>
+            </a:schemeClr>
+          </a:lnRef>
+          <a:fillRef idx="1">
+            <a:schemeClr val="accent1"/>
+          </a:fillRef>
+          <a:effectRef idx="0">
+            <a:schemeClr val="accent1"/>
+          </a:effectRef>
+          <a:fontRef idx="minor">
+            <a:schemeClr val="lt1"/>
+          </a:fontRef>
+        </p:style>
+        <p:txBody>
+          <a:bodyPr rot="0" spcFirstLastPara="0" vertOverflow="overflow" horzOverflow="overflow" vert="horz" wrap="square" lIns="91440" tIns="45724" rIns="91440" bIns="45724" numCol="1" spcCol="0" rtlCol="0" fromWordArt="0" anchor="ctr" anchorCtr="0" forceAA="0" compatLnSpc="1">
+            <a:prstTxWarp prst="textNoShape">
+              <a:avLst/>
+            </a:prstTxWarp>
+            <a:noAutofit/>
+          </a:bodyPr>
+          <a:lstStyle/>
+          <a:p>
+            <a:pPr algn="ctr"/>
+            <a:r>
+              <a:rPr lang="en-US" sz="6000" dirty="0" smtClean="0"/>
+              <a:t>C</a:t>
+            </a:r>
+            <a:endParaRPr lang="en-US" sz="6000" dirty="0"/>
+          </a:p>
+        </p:txBody>
+      </p:sp>
+      <p:sp>
+        <p:nvSpPr>
+          <p:cNvPr id="8" name="Rounded Rectangle 7"/>
+          <p:cNvSpPr/>
+          <p:nvPr/>
+        </p:nvSpPr>
+        <p:spPr>
+          <a:xfrm>
+            <a:off x="497549" y="488580"/>
+            <a:ext cx="1008531" cy="1008531"/>
+          </a:xfrm>
+          <a:prstGeom prst="roundRect">
+            <a:avLst/>
+          </a:prstGeom>
+          <a:solidFill>
+            <a:schemeClr val="accent1"/>
+          </a:solidFill>
+          <a:ln>
+            <a:noFill/>
+          </a:ln>
+        </p:spPr>
+        <p:style>
+          <a:lnRef idx="2">
+            <a:schemeClr val="accent1">
+              <a:shade val="50000"/>
+            </a:schemeClr>
+          </a:lnRef>
+          <a:fillRef idx="1">
+            <a:schemeClr val="accent1"/>
+          </a:fillRef>
+          <a:effectRef idx="0">
+            <a:schemeClr val="accent1"/>
+          </a:effectRef>
+          <a:fontRef idx="minor">
+            <a:schemeClr val="lt1"/>
+          </a:fontRef>
+        </p:style>
+        <p:txBody>
+          <a:bodyPr rot="0" spcFirstLastPara="0" vertOverflow="overflow" horzOverflow="overflow" vert="horz" wrap="square" lIns="91440" tIns="45724" rIns="91440" bIns="45724" numCol="1" spcCol="0" rtlCol="0" fromWordArt="0" anchor="ctr" anchorCtr="0" forceAA="0" compatLnSpc="1">
+            <a:prstTxWarp prst="textNoShape">
+              <a:avLst/>
+            </a:prstTxWarp>
+            <a:noAutofit/>
+          </a:bodyPr>
+          <a:lstStyle/>
+          <a:p>
+            <a:pPr algn="ctr"/>
+            <a:r>
+              <a:rPr lang="en-US" sz="6000" dirty="0" smtClean="0"/>
+              <a:t>G</a:t>
+            </a:r>
+            <a:endParaRPr lang="en-US" sz="6000" dirty="0"/>
+          </a:p>
+        </p:txBody>
+      </p:sp>
+      <p:sp>
+        <p:nvSpPr>
+          <p:cNvPr id="10" name="Rounded Rectangle 9"/>
+          <p:cNvSpPr/>
+          <p:nvPr/>
+        </p:nvSpPr>
+        <p:spPr>
+          <a:xfrm>
+            <a:off x="1398493" y="3523136"/>
+            <a:ext cx="1008531" cy="1008531"/>
+          </a:xfrm>
+          <a:prstGeom prst="roundRect">
+            <a:avLst/>
+          </a:prstGeom>
+          <a:solidFill>
+            <a:schemeClr val="accent2">
+              <a:lumMod val="40000"/>
+              <a:lumOff val="60000"/>
+            </a:schemeClr>
+          </a:solidFill>
+          <a:ln>
+            <a:noFill/>
+          </a:ln>
+        </p:spPr>
+        <p:style>
+          <a:lnRef idx="2">
+            <a:schemeClr val="accent1">
+              <a:shade val="50000"/>
+            </a:schemeClr>
+          </a:lnRef>
+          <a:fillRef idx="1">
+            <a:schemeClr val="accent1"/>
+          </a:fillRef>
+          <a:effectRef idx="0">
+            <a:schemeClr val="accent1"/>
+          </a:effectRef>
+          <a:fontRef idx="minor">
+            <a:schemeClr val="lt1"/>
+          </a:fontRef>
+        </p:style>
+        <p:txBody>
+          <a:bodyPr rot="0" spcFirstLastPara="0" vertOverflow="overflow" horzOverflow="overflow" vert="horz" wrap="square" lIns="91440" tIns="45724" rIns="91440" bIns="45724" numCol="1" spcCol="0" rtlCol="0" fromWordArt="0" anchor="ctr" anchorCtr="0" forceAA="0" compatLnSpc="1">
+            <a:prstTxWarp prst="textNoShape">
+              <a:avLst/>
+            </a:prstTxWarp>
+            <a:noAutofit/>
+          </a:bodyPr>
+          <a:lstStyle/>
+          <a:p>
+            <a:pPr algn="ctr"/>
+            <a:r>
+              <a:rPr lang="en-US" sz="6000" dirty="0"/>
+              <a:t>H</a:t>
+            </a:r>
+            <a:endParaRPr lang="en-US" sz="6000" dirty="0"/>
+          </a:p>
+        </p:txBody>
+      </p:sp>
+      <p:sp>
+        <p:nvSpPr>
+          <p:cNvPr id="11" name="Rounded Rectangle 10"/>
+          <p:cNvSpPr/>
+          <p:nvPr/>
+        </p:nvSpPr>
+        <p:spPr>
+          <a:xfrm>
+            <a:off x="389961" y="2505643"/>
+            <a:ext cx="1008531" cy="1008531"/>
+          </a:xfrm>
+          <a:prstGeom prst="roundRect">
+            <a:avLst/>
+          </a:prstGeom>
+          <a:solidFill>
+            <a:srgbClr val="FFC000"/>
+          </a:solidFill>
+          <a:ln>
+            <a:noFill/>
+          </a:ln>
+        </p:spPr>
+        <p:style>
+          <a:lnRef idx="2">
+            <a:schemeClr val="accent1">
+              <a:shade val="50000"/>
+            </a:schemeClr>
+          </a:lnRef>
+          <a:fillRef idx="1">
+            <a:schemeClr val="accent1"/>
+          </a:fillRef>
+          <a:effectRef idx="0">
+            <a:schemeClr val="accent1"/>
+          </a:effectRef>
+          <a:fontRef idx="minor">
+            <a:schemeClr val="lt1"/>
+          </a:fontRef>
+        </p:style>
+        <p:txBody>
+          <a:bodyPr rot="0" spcFirstLastPara="0" vertOverflow="overflow" horzOverflow="overflow" vert="horz" wrap="square" lIns="91440" tIns="45724" rIns="91440" bIns="45724" numCol="1" spcCol="0" rtlCol="0" fromWordArt="0" anchor="ctr" anchorCtr="0" forceAA="0" compatLnSpc="1">
+            <a:prstTxWarp prst="textNoShape">
+              <a:avLst/>
+            </a:prstTxWarp>
+            <a:noAutofit/>
+          </a:bodyPr>
+          <a:lstStyle/>
+          <a:p>
+            <a:pPr algn="ctr"/>
+            <a:r>
+              <a:rPr lang="en-US" sz="6000" dirty="0"/>
+              <a:t>C</a:t>
+            </a:r>
+            <a:endParaRPr lang="en-US" sz="6000" dirty="0"/>
+          </a:p>
+        </p:txBody>
+      </p:sp>
+      <p:sp>
+        <p:nvSpPr>
+          <p:cNvPr id="14" name="Rounded Rectangle 13"/>
+          <p:cNvSpPr/>
+          <p:nvPr/>
+        </p:nvSpPr>
+        <p:spPr>
+          <a:xfrm>
+            <a:off x="3496241" y="497542"/>
+            <a:ext cx="1008531" cy="1008531"/>
+          </a:xfrm>
+          <a:prstGeom prst="roundRect">
+            <a:avLst/>
+          </a:prstGeom>
+          <a:solidFill>
+            <a:srgbClr val="FF0000"/>
+          </a:solidFill>
+          <a:ln>
+            <a:noFill/>
+          </a:ln>
+        </p:spPr>
+        <p:style>
+          <a:lnRef idx="2">
+            <a:schemeClr val="accent1">
+              <a:shade val="50000"/>
+            </a:schemeClr>
+          </a:lnRef>
+          <a:fillRef idx="1">
+            <a:schemeClr val="accent1"/>
+          </a:fillRef>
+          <a:effectRef idx="0">
+            <a:schemeClr val="accent1"/>
+          </a:effectRef>
+          <a:fontRef idx="minor">
+            <a:schemeClr val="lt1"/>
+          </a:fontRef>
+        </p:style>
+        <p:txBody>
+          <a:bodyPr rot="0" spcFirstLastPara="0" vertOverflow="overflow" horzOverflow="overflow" vert="horz" wrap="square" lIns="91440" tIns="45724" rIns="91440" bIns="45724" numCol="1" spcCol="0" rtlCol="0" fromWordArt="0" anchor="ctr" anchorCtr="0" forceAA="0" compatLnSpc="1">
+            <a:prstTxWarp prst="textNoShape">
+              <a:avLst/>
+            </a:prstTxWarp>
+            <a:noAutofit/>
+          </a:bodyPr>
+          <a:lstStyle/>
+          <a:p>
+            <a:pPr algn="ctr"/>
+            <a:r>
+              <a:rPr lang="en-US" sz="6000" dirty="0"/>
+              <a:t>N</a:t>
+            </a:r>
+            <a:endParaRPr lang="en-US" sz="6000" dirty="0"/>
+          </a:p>
+        </p:txBody>
+      </p:sp>
+    </p:spTree>
+    <p:extLst>
+      <p:ext uri="{BB962C8B-B14F-4D97-AF65-F5344CB8AC3E}">
+        <p14:creationId xmlns:p14="http://schemas.microsoft.com/office/powerpoint/2010/main" val="24303638"/>
       </p:ext>
     </p:extLst>
   </p:cSld>

</xml_diff>